<commit_message>
gestion de projet MAJ
</commit_message>
<xml_diff>
--- a/Présentation projet web.pptx
+++ b/Présentation projet web.pptx
@@ -11207,7 +11207,7 @@
               <a:buNone/>
             </a:pPr>
             <a:r>
-              <a:rPr lang="fr"/>
+              <a:rPr lang="fr" dirty="0"/>
               <a:t>Gestion de projet</a:t>
             </a:r>
           </a:p>
@@ -11288,8 +11288,13 @@
             </a:pPr>
             <a:r>
               <a:rPr lang="fr" dirty="0"/>
-              <a:t>Cette semaine :</a:t>
+              <a:t>Cette semaine </a:t>
             </a:r>
+            <a:r>
+              <a:rPr lang="fr" dirty="0" smtClean="0"/>
+              <a:t>:</a:t>
+            </a:r>
+            <a:endParaRPr lang="fr" dirty="0"/>
           </a:p>
           <a:p>
             <a:pPr marL="914400" lvl="1" indent="-304800" rtl="0">
@@ -11303,9 +11308,10 @@
               <a:buChar char="-"/>
             </a:pPr>
             <a:r>
-              <a:rPr lang="fr" sz="1200" dirty="0"/>
-              <a:t>Finition des User Stories et établissement du premier sprint </a:t>
+              <a:rPr lang="fr" sz="1200" dirty="0" smtClean="0"/>
+              <a:t>Etablissement des sprints</a:t>
             </a:r>
+            <a:endParaRPr lang="fr" sz="1200" dirty="0"/>
           </a:p>
           <a:p>
             <a:pPr marL="914400" lvl="1" indent="-304800" rtl="0">

</xml_diff>